<commit_message>
favicon, presentation & screenshots
</commit_message>
<xml_diff>
--- a/Projects/CyberGuard/Documentation/Project_Presentation.pptx
+++ b/Projects/CyberGuard/Documentation/Project_Presentation.pptx
@@ -1,21 +1,27 @@
 
 <file path=ppt/presentation.xml><?xml version="1.0" encoding="utf-8"?>
-<p:presentation xmlns:a="http://schemas.openxmlformats.org/drawingml/2006/main" xmlns:r="http://schemas.openxmlformats.org/officeDocument/2006/relationships" xmlns:p="http://schemas.openxmlformats.org/presentationml/2006/main" saveSubsetFonts="1" embedTrueTypeFonts="true">
+<p:presentation xmlns:a="http://schemas.openxmlformats.org/drawingml/2006/main" xmlns:r="http://schemas.openxmlformats.org/officeDocument/2006/relationships" xmlns:p="http://schemas.openxmlformats.org/presentationml/2006/main" embedTrueTypeFonts="1" saveSubsetFonts="1">
   <p:sldMasterIdLst>
     <p:sldMasterId id="2147483648" r:id="rId1"/>
   </p:sldMasterIdLst>
   <p:sldIdLst>
-    <p:sldId id="256" r:id="rId6"/>
-    <p:sldId id="257" r:id="rId7"/>
-    <p:sldId id="258" r:id="rId8"/>
-    <p:sldId id="259" r:id="rId9"/>
-    <p:sldId id="260" r:id="rId10"/>
-    <p:sldId id="261" r:id="rId11"/>
-    <p:sldId id="262" r:id="rId12"/>
-    <p:sldId id="263" r:id="rId13"/>
-    <p:sldId id="264" r:id="rId14"/>
-    <p:sldId id="265" r:id="rId15"/>
-    <p:sldId id="266" r:id="rId16"/>
+    <p:sldId id="256" r:id="rId2"/>
+    <p:sldId id="257" r:id="rId3"/>
+    <p:sldId id="258" r:id="rId4"/>
+    <p:sldId id="259" r:id="rId5"/>
+    <p:sldId id="267" r:id="rId6"/>
+    <p:sldId id="268" r:id="rId7"/>
+    <p:sldId id="269" r:id="rId8"/>
+    <p:sldId id="272" r:id="rId9"/>
+    <p:sldId id="271" r:id="rId10"/>
+    <p:sldId id="270" r:id="rId11"/>
+    <p:sldId id="260" r:id="rId12"/>
+    <p:sldId id="261" r:id="rId13"/>
+    <p:sldId id="262" r:id="rId14"/>
+    <p:sldId id="263" r:id="rId15"/>
+    <p:sldId id="264" r:id="rId16"/>
+    <p:sldId id="265" r:id="rId17"/>
+    <p:sldId id="266" r:id="rId18"/>
   </p:sldIdLst>
   <p:sldSz cx="18288000" cy="10287000"/>
   <p:notesSz cx="6858000" cy="9144000"/>
@@ -114,6 +120,22 @@
       </a:defRPr>
     </a:lvl9pPr>
   </p:defaultTextStyle>
+  <p:extLst>
+    <p:ext uri="{EFAFB233-063F-42B5-8137-9DF3F51BA10A}">
+      <p15:sldGuideLst xmlns:p15="http://schemas.microsoft.com/office/powerpoint/2012/main">
+        <p15:guide id="1" orient="horz" pos="2160">
+          <p15:clr>
+            <a:srgbClr val="A4A3A4"/>
+          </p15:clr>
+        </p15:guide>
+        <p15:guide id="2" pos="2880">
+          <p15:clr>
+            <a:srgbClr val="A4A3A4"/>
+          </p15:clr>
+        </p15:guide>
+      </p15:sldGuideLst>
+    </p:ext>
+  </p:extLst>
 </p:presentation>
 </file>
 
@@ -155,10 +177,9 @@
           <a:lstStyle/>
           <a:p>
             <a:r>
-              <a:rPr lang="en-US" smtClean="0"/>
+              <a:rPr lang="en-US"/>
               <a:t>Click to edit Master title style</a:t>
             </a:r>
-            <a:endParaRPr lang="en-US"/>
           </a:p>
         </p:txBody>
       </p:sp>
@@ -274,10 +295,9 @@
           </a:lstStyle>
           <a:p>
             <a:r>
-              <a:rPr lang="en-US" smtClean="0"/>
+              <a:rPr lang="en-US"/>
               <a:t>Click to edit Master subtitle style</a:t>
             </a:r>
-            <a:endParaRPr lang="en-US"/>
           </a:p>
         </p:txBody>
       </p:sp>
@@ -299,7 +319,7 @@
             <a:fld id="{1D8BD707-D9CF-40AE-B4C6-C98DA3205C09}" type="datetimeFigureOut">
               <a:rPr lang="en-US" smtClean="0"/>
               <a:pPr/>
-              <a:t>8/1/2011</a:t>
+              <a:t>5/13/2025</a:t>
             </a:fld>
             <a:endParaRPr lang="en-US"/>
           </a:p>
@@ -389,10 +409,9 @@
           <a:lstStyle/>
           <a:p>
             <a:r>
-              <a:rPr lang="en-US" smtClean="0"/>
+              <a:rPr lang="en-US"/>
               <a:t>Click to edit Master title style</a:t>
             </a:r>
-            <a:endParaRPr lang="en-US"/>
           </a:p>
         </p:txBody>
       </p:sp>
@@ -413,38 +432,37 @@
           <a:p>
             <a:pPr lvl="0"/>
             <a:r>
-              <a:rPr lang="en-US" smtClean="0"/>
+              <a:rPr lang="en-US"/>
               <a:t>Click to edit Master text styles</a:t>
             </a:r>
           </a:p>
           <a:p>
             <a:pPr lvl="1"/>
             <a:r>
-              <a:rPr lang="en-US" smtClean="0"/>
+              <a:rPr lang="en-US"/>
               <a:t>Second level</a:t>
             </a:r>
           </a:p>
           <a:p>
             <a:pPr lvl="2"/>
             <a:r>
-              <a:rPr lang="en-US" smtClean="0"/>
+              <a:rPr lang="en-US"/>
               <a:t>Third level</a:t>
             </a:r>
           </a:p>
           <a:p>
             <a:pPr lvl="3"/>
             <a:r>
-              <a:rPr lang="en-US" smtClean="0"/>
+              <a:rPr lang="en-US"/>
               <a:t>Fourth level</a:t>
             </a:r>
           </a:p>
           <a:p>
             <a:pPr lvl="4"/>
             <a:r>
-              <a:rPr lang="en-US" smtClean="0"/>
+              <a:rPr lang="en-US"/>
               <a:t>Fifth level</a:t>
             </a:r>
-            <a:endParaRPr lang="en-US"/>
           </a:p>
         </p:txBody>
       </p:sp>
@@ -466,7 +484,7 @@
             <a:fld id="{1D8BD707-D9CF-40AE-B4C6-C98DA3205C09}" type="datetimeFigureOut">
               <a:rPr lang="en-US" smtClean="0"/>
               <a:pPr/>
-              <a:t>8/1/2011</a:t>
+              <a:t>5/13/2025</a:t>
             </a:fld>
             <a:endParaRPr lang="en-US"/>
           </a:p>
@@ -561,10 +579,9 @@
           <a:lstStyle/>
           <a:p>
             <a:r>
-              <a:rPr lang="en-US" smtClean="0"/>
+              <a:rPr lang="en-US"/>
               <a:t>Click to edit Master title style</a:t>
             </a:r>
-            <a:endParaRPr lang="en-US"/>
           </a:p>
         </p:txBody>
       </p:sp>
@@ -590,38 +607,37 @@
           <a:p>
             <a:pPr lvl="0"/>
             <a:r>
-              <a:rPr lang="en-US" smtClean="0"/>
+              <a:rPr lang="en-US"/>
               <a:t>Click to edit Master text styles</a:t>
             </a:r>
           </a:p>
           <a:p>
             <a:pPr lvl="1"/>
             <a:r>
-              <a:rPr lang="en-US" smtClean="0"/>
+              <a:rPr lang="en-US"/>
               <a:t>Second level</a:t>
             </a:r>
           </a:p>
           <a:p>
             <a:pPr lvl="2"/>
             <a:r>
-              <a:rPr lang="en-US" smtClean="0"/>
+              <a:rPr lang="en-US"/>
               <a:t>Third level</a:t>
             </a:r>
           </a:p>
           <a:p>
             <a:pPr lvl="3"/>
             <a:r>
-              <a:rPr lang="en-US" smtClean="0"/>
+              <a:rPr lang="en-US"/>
               <a:t>Fourth level</a:t>
             </a:r>
           </a:p>
           <a:p>
             <a:pPr lvl="4"/>
             <a:r>
-              <a:rPr lang="en-US" smtClean="0"/>
+              <a:rPr lang="en-US"/>
               <a:t>Fifth level</a:t>
             </a:r>
-            <a:endParaRPr lang="en-US"/>
           </a:p>
         </p:txBody>
       </p:sp>
@@ -643,7 +659,7 @@
             <a:fld id="{1D8BD707-D9CF-40AE-B4C6-C98DA3205C09}" type="datetimeFigureOut">
               <a:rPr lang="en-US" smtClean="0"/>
               <a:pPr/>
-              <a:t>8/1/2011</a:t>
+              <a:t>5/13/2025</a:t>
             </a:fld>
             <a:endParaRPr lang="en-US"/>
           </a:p>
@@ -733,10 +749,9 @@
           <a:lstStyle/>
           <a:p>
             <a:r>
-              <a:rPr lang="en-US" smtClean="0"/>
+              <a:rPr lang="en-US"/>
               <a:t>Click to edit Master title style</a:t>
             </a:r>
-            <a:endParaRPr lang="en-US"/>
           </a:p>
         </p:txBody>
       </p:sp>
@@ -757,38 +772,37 @@
           <a:p>
             <a:pPr lvl="0"/>
             <a:r>
-              <a:rPr lang="en-US" smtClean="0"/>
+              <a:rPr lang="en-US"/>
               <a:t>Click to edit Master text styles</a:t>
             </a:r>
           </a:p>
           <a:p>
             <a:pPr lvl="1"/>
             <a:r>
-              <a:rPr lang="en-US" smtClean="0"/>
+              <a:rPr lang="en-US"/>
               <a:t>Second level</a:t>
             </a:r>
           </a:p>
           <a:p>
             <a:pPr lvl="2"/>
             <a:r>
-              <a:rPr lang="en-US" smtClean="0"/>
+              <a:rPr lang="en-US"/>
               <a:t>Third level</a:t>
             </a:r>
           </a:p>
           <a:p>
             <a:pPr lvl="3"/>
             <a:r>
-              <a:rPr lang="en-US" smtClean="0"/>
+              <a:rPr lang="en-US"/>
               <a:t>Fourth level</a:t>
             </a:r>
           </a:p>
           <a:p>
             <a:pPr lvl="4"/>
             <a:r>
-              <a:rPr lang="en-US" smtClean="0"/>
+              <a:rPr lang="en-US"/>
               <a:t>Fifth level</a:t>
             </a:r>
-            <a:endParaRPr lang="en-US"/>
           </a:p>
         </p:txBody>
       </p:sp>
@@ -810,7 +824,7 @@
             <a:fld id="{1D8BD707-D9CF-40AE-B4C6-C98DA3205C09}" type="datetimeFigureOut">
               <a:rPr lang="en-US" smtClean="0"/>
               <a:pPr/>
-              <a:t>8/1/2011</a:t>
+              <a:t>5/13/2025</a:t>
             </a:fld>
             <a:endParaRPr lang="en-US"/>
           </a:p>
@@ -909,10 +923,9 @@
           </a:lstStyle>
           <a:p>
             <a:r>
-              <a:rPr lang="en-US" smtClean="0"/>
+              <a:rPr lang="en-US"/>
               <a:t>Click to edit Master title style</a:t>
             </a:r>
-            <a:endParaRPr lang="en-US"/>
           </a:p>
         </p:txBody>
       </p:sp>
@@ -1029,7 +1042,7 @@
           <a:p>
             <a:pPr lvl="0"/>
             <a:r>
-              <a:rPr lang="en-US" smtClean="0"/>
+              <a:rPr lang="en-US"/>
               <a:t>Click to edit Master text styles</a:t>
             </a:r>
           </a:p>
@@ -1053,7 +1066,7 @@
             <a:fld id="{1D8BD707-D9CF-40AE-B4C6-C98DA3205C09}" type="datetimeFigureOut">
               <a:rPr lang="en-US" smtClean="0"/>
               <a:pPr/>
-              <a:t>8/1/2011</a:t>
+              <a:t>5/13/2025</a:t>
             </a:fld>
             <a:endParaRPr lang="en-US"/>
           </a:p>
@@ -1143,10 +1156,9 @@
           <a:lstStyle/>
           <a:p>
             <a:r>
-              <a:rPr lang="en-US" smtClean="0"/>
+              <a:rPr lang="en-US"/>
               <a:t>Click to edit Master title style</a:t>
             </a:r>
-            <a:endParaRPr lang="en-US"/>
           </a:p>
         </p:txBody>
       </p:sp>
@@ -1200,38 +1212,37 @@
           <a:p>
             <a:pPr lvl="0"/>
             <a:r>
-              <a:rPr lang="en-US" smtClean="0"/>
+              <a:rPr lang="en-US"/>
               <a:t>Click to edit Master text styles</a:t>
             </a:r>
           </a:p>
           <a:p>
             <a:pPr lvl="1"/>
             <a:r>
-              <a:rPr lang="en-US" smtClean="0"/>
+              <a:rPr lang="en-US"/>
               <a:t>Second level</a:t>
             </a:r>
           </a:p>
           <a:p>
             <a:pPr lvl="2"/>
             <a:r>
-              <a:rPr lang="en-US" smtClean="0"/>
+              <a:rPr lang="en-US"/>
               <a:t>Third level</a:t>
             </a:r>
           </a:p>
           <a:p>
             <a:pPr lvl="3"/>
             <a:r>
-              <a:rPr lang="en-US" smtClean="0"/>
+              <a:rPr lang="en-US"/>
               <a:t>Fourth level</a:t>
             </a:r>
           </a:p>
           <a:p>
             <a:pPr lvl="4"/>
             <a:r>
-              <a:rPr lang="en-US" smtClean="0"/>
+              <a:rPr lang="en-US"/>
               <a:t>Fifth level</a:t>
             </a:r>
-            <a:endParaRPr lang="en-US"/>
           </a:p>
         </p:txBody>
       </p:sp>
@@ -1285,38 +1296,37 @@
           <a:p>
             <a:pPr lvl="0"/>
             <a:r>
-              <a:rPr lang="en-US" smtClean="0"/>
+              <a:rPr lang="en-US"/>
               <a:t>Click to edit Master text styles</a:t>
             </a:r>
           </a:p>
           <a:p>
             <a:pPr lvl="1"/>
             <a:r>
-              <a:rPr lang="en-US" smtClean="0"/>
+              <a:rPr lang="en-US"/>
               <a:t>Second level</a:t>
             </a:r>
           </a:p>
           <a:p>
             <a:pPr lvl="2"/>
             <a:r>
-              <a:rPr lang="en-US" smtClean="0"/>
+              <a:rPr lang="en-US"/>
               <a:t>Third level</a:t>
             </a:r>
           </a:p>
           <a:p>
             <a:pPr lvl="3"/>
             <a:r>
-              <a:rPr lang="en-US" smtClean="0"/>
+              <a:rPr lang="en-US"/>
               <a:t>Fourth level</a:t>
             </a:r>
           </a:p>
           <a:p>
             <a:pPr lvl="4"/>
             <a:r>
-              <a:rPr lang="en-US" smtClean="0"/>
+              <a:rPr lang="en-US"/>
               <a:t>Fifth level</a:t>
             </a:r>
-            <a:endParaRPr lang="en-US"/>
           </a:p>
         </p:txBody>
       </p:sp>
@@ -1338,7 +1348,7 @@
             <a:fld id="{1D8BD707-D9CF-40AE-B4C6-C98DA3205C09}" type="datetimeFigureOut">
               <a:rPr lang="en-US" smtClean="0"/>
               <a:pPr/>
-              <a:t>8/1/2011</a:t>
+              <a:t>5/13/2025</a:t>
             </a:fld>
             <a:endParaRPr lang="en-US"/>
           </a:p>
@@ -1432,10 +1442,9 @@
           </a:lstStyle>
           <a:p>
             <a:r>
-              <a:rPr lang="en-US" smtClean="0"/>
+              <a:rPr lang="en-US"/>
               <a:t>Click to edit Master title style</a:t>
             </a:r>
-            <a:endParaRPr lang="en-US"/>
           </a:p>
         </p:txBody>
       </p:sp>
@@ -1498,7 +1507,7 @@
           <a:p>
             <a:pPr lvl="0"/>
             <a:r>
-              <a:rPr lang="en-US" smtClean="0"/>
+              <a:rPr lang="en-US"/>
               <a:t>Click to edit Master text styles</a:t>
             </a:r>
           </a:p>
@@ -1554,38 +1563,37 @@
           <a:p>
             <a:pPr lvl="0"/>
             <a:r>
-              <a:rPr lang="en-US" smtClean="0"/>
+              <a:rPr lang="en-US"/>
               <a:t>Click to edit Master text styles</a:t>
             </a:r>
           </a:p>
           <a:p>
             <a:pPr lvl="1"/>
             <a:r>
-              <a:rPr lang="en-US" smtClean="0"/>
+              <a:rPr lang="en-US"/>
               <a:t>Second level</a:t>
             </a:r>
           </a:p>
           <a:p>
             <a:pPr lvl="2"/>
             <a:r>
-              <a:rPr lang="en-US" smtClean="0"/>
+              <a:rPr lang="en-US"/>
               <a:t>Third level</a:t>
             </a:r>
           </a:p>
           <a:p>
             <a:pPr lvl="3"/>
             <a:r>
-              <a:rPr lang="en-US" smtClean="0"/>
+              <a:rPr lang="en-US"/>
               <a:t>Fourth level</a:t>
             </a:r>
           </a:p>
           <a:p>
             <a:pPr lvl="4"/>
             <a:r>
-              <a:rPr lang="en-US" smtClean="0"/>
+              <a:rPr lang="en-US"/>
               <a:t>Fifth level</a:t>
             </a:r>
-            <a:endParaRPr lang="en-US"/>
           </a:p>
         </p:txBody>
       </p:sp>
@@ -1648,7 +1656,7 @@
           <a:p>
             <a:pPr lvl="0"/>
             <a:r>
-              <a:rPr lang="en-US" smtClean="0"/>
+              <a:rPr lang="en-US"/>
               <a:t>Click to edit Master text styles</a:t>
             </a:r>
           </a:p>
@@ -1704,38 +1712,37 @@
           <a:p>
             <a:pPr lvl="0"/>
             <a:r>
-              <a:rPr lang="en-US" smtClean="0"/>
+              <a:rPr lang="en-US"/>
               <a:t>Click to edit Master text styles</a:t>
             </a:r>
           </a:p>
           <a:p>
             <a:pPr lvl="1"/>
             <a:r>
-              <a:rPr lang="en-US" smtClean="0"/>
+              <a:rPr lang="en-US"/>
               <a:t>Second level</a:t>
             </a:r>
           </a:p>
           <a:p>
             <a:pPr lvl="2"/>
             <a:r>
-              <a:rPr lang="en-US" smtClean="0"/>
+              <a:rPr lang="en-US"/>
               <a:t>Third level</a:t>
             </a:r>
           </a:p>
           <a:p>
             <a:pPr lvl="3"/>
             <a:r>
-              <a:rPr lang="en-US" smtClean="0"/>
+              <a:rPr lang="en-US"/>
               <a:t>Fourth level</a:t>
             </a:r>
           </a:p>
           <a:p>
             <a:pPr lvl="4"/>
             <a:r>
-              <a:rPr lang="en-US" smtClean="0"/>
+              <a:rPr lang="en-US"/>
               <a:t>Fifth level</a:t>
             </a:r>
-            <a:endParaRPr lang="en-US"/>
           </a:p>
         </p:txBody>
       </p:sp>
@@ -1757,7 +1764,7 @@
             <a:fld id="{1D8BD707-D9CF-40AE-B4C6-C98DA3205C09}" type="datetimeFigureOut">
               <a:rPr lang="en-US" smtClean="0"/>
               <a:pPr/>
-              <a:t>8/1/2011</a:t>
+              <a:t>5/13/2025</a:t>
             </a:fld>
             <a:endParaRPr lang="en-US"/>
           </a:p>
@@ -1847,10 +1854,9 @@
           <a:lstStyle/>
           <a:p>
             <a:r>
-              <a:rPr lang="en-US" smtClean="0"/>
+              <a:rPr lang="en-US"/>
               <a:t>Click to edit Master title style</a:t>
             </a:r>
-            <a:endParaRPr lang="en-US"/>
           </a:p>
         </p:txBody>
       </p:sp>
@@ -1872,7 +1878,7 @@
             <a:fld id="{1D8BD707-D9CF-40AE-B4C6-C98DA3205C09}" type="datetimeFigureOut">
               <a:rPr lang="en-US" smtClean="0"/>
               <a:pPr/>
-              <a:t>8/1/2011</a:t>
+              <a:t>5/13/2025</a:t>
             </a:fld>
             <a:endParaRPr lang="en-US"/>
           </a:p>
@@ -1964,7 +1970,7 @@
             <a:fld id="{1D8BD707-D9CF-40AE-B4C6-C98DA3205C09}" type="datetimeFigureOut">
               <a:rPr lang="en-US" smtClean="0"/>
               <a:pPr/>
-              <a:t>8/1/2011</a:t>
+              <a:t>5/13/2025</a:t>
             </a:fld>
             <a:endParaRPr lang="en-US"/>
           </a:p>
@@ -2063,10 +2069,9 @@
           </a:lstStyle>
           <a:p>
             <a:r>
-              <a:rPr lang="en-US" smtClean="0"/>
+              <a:rPr lang="en-US"/>
               <a:t>Click to edit Master title style</a:t>
             </a:r>
-            <a:endParaRPr lang="en-US"/>
           </a:p>
         </p:txBody>
       </p:sp>
@@ -2120,38 +2125,37 @@
           <a:p>
             <a:pPr lvl="0"/>
             <a:r>
-              <a:rPr lang="en-US" smtClean="0"/>
+              <a:rPr lang="en-US"/>
               <a:t>Click to edit Master text styles</a:t>
             </a:r>
           </a:p>
           <a:p>
             <a:pPr lvl="1"/>
             <a:r>
-              <a:rPr lang="en-US" smtClean="0"/>
+              <a:rPr lang="en-US"/>
               <a:t>Second level</a:t>
             </a:r>
           </a:p>
           <a:p>
             <a:pPr lvl="2"/>
             <a:r>
-              <a:rPr lang="en-US" smtClean="0"/>
+              <a:rPr lang="en-US"/>
               <a:t>Third level</a:t>
             </a:r>
           </a:p>
           <a:p>
             <a:pPr lvl="3"/>
             <a:r>
-              <a:rPr lang="en-US" smtClean="0"/>
+              <a:rPr lang="en-US"/>
               <a:t>Fourth level</a:t>
             </a:r>
           </a:p>
           <a:p>
             <a:pPr lvl="4"/>
             <a:r>
-              <a:rPr lang="en-US" smtClean="0"/>
+              <a:rPr lang="en-US"/>
               <a:t>Fifth level</a:t>
             </a:r>
-            <a:endParaRPr lang="en-US"/>
           </a:p>
         </p:txBody>
       </p:sp>
@@ -2214,7 +2218,7 @@
           <a:p>
             <a:pPr lvl="0"/>
             <a:r>
-              <a:rPr lang="en-US" smtClean="0"/>
+              <a:rPr lang="en-US"/>
               <a:t>Click to edit Master text styles</a:t>
             </a:r>
           </a:p>
@@ -2238,7 +2242,7 @@
             <a:fld id="{1D8BD707-D9CF-40AE-B4C6-C98DA3205C09}" type="datetimeFigureOut">
               <a:rPr lang="en-US" smtClean="0"/>
               <a:pPr/>
-              <a:t>8/1/2011</a:t>
+              <a:t>5/13/2025</a:t>
             </a:fld>
             <a:endParaRPr lang="en-US"/>
           </a:p>
@@ -2337,10 +2341,9 @@
           </a:lstStyle>
           <a:p>
             <a:r>
-              <a:rPr lang="en-US" smtClean="0"/>
+              <a:rPr lang="en-US"/>
               <a:t>Click to edit Master title style</a:t>
             </a:r>
-            <a:endParaRPr lang="en-US"/>
           </a:p>
         </p:txBody>
       </p:sp>
@@ -2464,7 +2467,7 @@
           <a:p>
             <a:pPr lvl="0"/>
             <a:r>
-              <a:rPr lang="en-US" smtClean="0"/>
+              <a:rPr lang="en-US"/>
               <a:t>Click to edit Master text styles</a:t>
             </a:r>
           </a:p>
@@ -2488,7 +2491,7 @@
             <a:fld id="{1D8BD707-D9CF-40AE-B4C6-C98DA3205C09}" type="datetimeFigureOut">
               <a:rPr lang="en-US" smtClean="0"/>
               <a:pPr/>
-              <a:t>8/1/2011</a:t>
+              <a:t>5/13/2025</a:t>
             </a:fld>
             <a:endParaRPr lang="en-US"/>
           </a:p>
@@ -2549,9 +2552,12 @@
 <p:sldMaster xmlns:a="http://schemas.openxmlformats.org/drawingml/2006/main" xmlns:r="http://schemas.openxmlformats.org/officeDocument/2006/relationships" xmlns:p="http://schemas.openxmlformats.org/presentationml/2006/main">
   <p:cSld>
     <p:bg>
-      <p:bgRef idx="1001">
-        <a:schemeClr val="bg1"/>
-      </p:bgRef>
+      <p:bgPr>
+        <a:solidFill>
+          <a:srgbClr val="2C2C2C"/>
+        </a:solidFill>
+        <a:effectLst/>
+      </p:bgPr>
     </p:bg>
     <p:spTree>
       <p:nvGrpSpPr>
@@ -2593,10 +2599,9 @@
           <a:lstStyle/>
           <a:p>
             <a:r>
-              <a:rPr lang="en-US" smtClean="0"/>
+              <a:rPr lang="en-US"/>
               <a:t>Click to edit Master title style</a:t>
             </a:r>
-            <a:endParaRPr lang="en-US"/>
           </a:p>
         </p:txBody>
       </p:sp>
@@ -2627,38 +2632,37 @@
           <a:p>
             <a:pPr lvl="0"/>
             <a:r>
-              <a:rPr lang="en-US" smtClean="0"/>
+              <a:rPr lang="en-US"/>
               <a:t>Click to edit Master text styles</a:t>
             </a:r>
           </a:p>
           <a:p>
             <a:pPr lvl="1"/>
             <a:r>
-              <a:rPr lang="en-US" smtClean="0"/>
+              <a:rPr lang="en-US"/>
               <a:t>Second level</a:t>
             </a:r>
           </a:p>
           <a:p>
             <a:pPr lvl="2"/>
             <a:r>
-              <a:rPr lang="en-US" smtClean="0"/>
+              <a:rPr lang="en-US"/>
               <a:t>Third level</a:t>
             </a:r>
           </a:p>
           <a:p>
             <a:pPr lvl="3"/>
             <a:r>
-              <a:rPr lang="en-US" smtClean="0"/>
+              <a:rPr lang="en-US"/>
               <a:t>Fourth level</a:t>
             </a:r>
           </a:p>
           <a:p>
             <a:pPr lvl="4"/>
             <a:r>
-              <a:rPr lang="en-US" smtClean="0"/>
+              <a:rPr lang="en-US"/>
               <a:t>Fifth level</a:t>
             </a:r>
-            <a:endParaRPr lang="en-US"/>
           </a:p>
         </p:txBody>
       </p:sp>
@@ -2698,7 +2702,7 @@
             <a:fld id="{1D8BD707-D9CF-40AE-B4C6-C98DA3205C09}" type="datetimeFigureOut">
               <a:rPr lang="en-US" smtClean="0"/>
               <a:pPr/>
-              <a:t>8/1/2011</a:t>
+              <a:t>5/13/2025</a:t>
             </a:fld>
             <a:endParaRPr lang="en-US"/>
           </a:p>
@@ -3053,7 +3057,7 @@
 </file>
 
 <file path=ppt/slides/slide1.xml><?xml version="1.0" encoding="utf-8"?>
-<p:sld xmlns:p="http://schemas.openxmlformats.org/presentationml/2006/main" xmlns:a="http://schemas.openxmlformats.org/drawingml/2006/main" xmlns:r="http://schemas.openxmlformats.org/officeDocument/2006/relationships">
+<p:sld xmlns:a="http://schemas.openxmlformats.org/drawingml/2006/main" xmlns:r="http://schemas.openxmlformats.org/officeDocument/2006/relationships" xmlns:p="http://schemas.openxmlformats.org/presentationml/2006/main">
   <p:cSld>
     <p:spTree>
       <p:nvGrpSpPr>
@@ -3071,12 +3075,12 @@
       </p:grpSpPr>
       <p:sp>
         <p:nvSpPr>
-          <p:cNvPr name="Freeform 2" id="2"/>
+          <p:cNvPr id="2" name="Freeform 2"/>
           <p:cNvSpPr/>
           <p:nvPr/>
         </p:nvSpPr>
         <p:spPr>
-          <a:xfrm flipH="false" flipV="false" rot="0">
+          <a:xfrm>
             <a:off x="3572" y="0"/>
             <a:ext cx="18287993" cy="10287000"/>
           </a:xfrm>
@@ -3085,9 +3089,9 @@
             <a:gdLst/>
             <a:ahLst/>
             <a:cxnLst/>
-            <a:rect r="r" b="b" t="t" l="l"/>
+            <a:rect l="l" t="t" r="r" b="b"/>
             <a:pathLst>
-              <a:path h="10287000" w="18287993">
+              <a:path w="18287993" h="10287000">
                 <a:moveTo>
                   <a:pt x="0" y="0"/>
                 </a:moveTo>
@@ -3110,7 +3114,7 @@
           <a:blipFill>
             <a:blip r:embed="rId2"/>
             <a:stretch>
-              <a:fillRect l="0" t="0" r="0" b="0"/>
+              <a:fillRect/>
             </a:stretch>
           </a:blipFill>
         </p:spPr>
@@ -3124,7 +3128,7 @@
 </file>
 
 <file path=ppt/slides/slide10.xml><?xml version="1.0" encoding="utf-8"?>
-<p:sld xmlns:p="http://schemas.openxmlformats.org/presentationml/2006/main" xmlns:a="http://schemas.openxmlformats.org/drawingml/2006/main" xmlns:r="http://schemas.openxmlformats.org/officeDocument/2006/relationships">
+<p:sld xmlns:a="http://schemas.openxmlformats.org/drawingml/2006/main" xmlns:r="http://schemas.openxmlformats.org/officeDocument/2006/relationships" xmlns:p="http://schemas.openxmlformats.org/presentationml/2006/main">
   <p:cSld>
     <p:spTree>
       <p:nvGrpSpPr>
@@ -3140,53 +3144,48 @@
           <a:chExt cx="0" cy="0"/>
         </a:xfrm>
       </p:grpSpPr>
-      <p:sp>
-        <p:nvSpPr>
-          <p:cNvPr name="Freeform 2" id="2"/>
-          <p:cNvSpPr/>
+      <p:pic>
+        <p:nvPicPr>
+          <p:cNvPr id="17" name="Picture 16">
+            <a:extLst>
+              <a:ext uri="{FF2B5EF4-FFF2-40B4-BE49-F238E27FC236}">
+                <a16:creationId xmlns:a16="http://schemas.microsoft.com/office/drawing/2014/main" id="{78080395-6CDB-1FAF-860F-241C914125C8}"/>
+              </a:ext>
+            </a:extLst>
+          </p:cNvPr>
+          <p:cNvPicPr>
+            <a:picLocks noChangeAspect="1"/>
+          </p:cNvPicPr>
           <p:nvPr/>
-        </p:nvSpPr>
+        </p:nvPicPr>
+        <p:blipFill>
+          <a:blip r:embed="rId2">
+            <a:extLst>
+              <a:ext uri="{28A0092B-C50C-407E-A947-70E740481C1C}">
+                <a14:useLocalDpi xmlns:a14="http://schemas.microsoft.com/office/drawing/2010/main" val="0"/>
+              </a:ext>
+            </a:extLst>
+          </a:blip>
+          <a:stretch>
+            <a:fillRect/>
+          </a:stretch>
+        </p:blipFill>
         <p:spPr>
-          <a:xfrm flipH="false" flipV="false" rot="0">
-            <a:off x="3572" y="0"/>
-            <a:ext cx="18287993" cy="10287000"/>
+          <a:xfrm>
+            <a:off x="723900" y="-2931"/>
+            <a:ext cx="16840200" cy="10153650"/>
           </a:xfrm>
-          <a:custGeom>
+          <a:prstGeom prst="rect">
             <a:avLst/>
-            <a:gdLst/>
-            <a:ahLst/>
-            <a:cxnLst/>
-            <a:rect r="r" b="b" t="t" l="l"/>
-            <a:pathLst>
-              <a:path h="10287000" w="18287993">
-                <a:moveTo>
-                  <a:pt x="0" y="0"/>
-                </a:moveTo>
-                <a:lnTo>
-                  <a:pt x="18287993" y="0"/>
-                </a:lnTo>
-                <a:lnTo>
-                  <a:pt x="18287993" y="10287000"/>
-                </a:lnTo>
-                <a:lnTo>
-                  <a:pt x="0" y="10287000"/>
-                </a:lnTo>
-                <a:lnTo>
-                  <a:pt x="0" y="0"/>
-                </a:lnTo>
-                <a:close/>
-              </a:path>
-            </a:pathLst>
-          </a:custGeom>
-          <a:blipFill>
-            <a:blip r:embed="rId2"/>
-            <a:stretch>
-              <a:fillRect l="0" t="0" r="0" b="0"/>
-            </a:stretch>
-          </a:blipFill>
+          </a:prstGeom>
         </p:spPr>
-      </p:sp>
+      </p:pic>
     </p:spTree>
+    <p:extLst>
+      <p:ext uri="{BB962C8B-B14F-4D97-AF65-F5344CB8AC3E}">
+        <p14:creationId xmlns:p14="http://schemas.microsoft.com/office/powerpoint/2010/main" val="2535542668"/>
+      </p:ext>
+    </p:extLst>
   </p:cSld>
   <p:clrMapOvr>
     <a:masterClrMapping/>
@@ -3195,7 +3194,7 @@
 </file>
 
 <file path=ppt/slides/slide11.xml><?xml version="1.0" encoding="utf-8"?>
-<p:sld xmlns:p="http://schemas.openxmlformats.org/presentationml/2006/main" xmlns:a="http://schemas.openxmlformats.org/drawingml/2006/main" xmlns:r="http://schemas.openxmlformats.org/officeDocument/2006/relationships">
+<p:sld xmlns:a="http://schemas.openxmlformats.org/drawingml/2006/main" xmlns:r="http://schemas.openxmlformats.org/officeDocument/2006/relationships" xmlns:p="http://schemas.openxmlformats.org/presentationml/2006/main">
   <p:cSld>
     <p:spTree>
       <p:nvGrpSpPr>
@@ -3213,12 +3212,12 @@
       </p:grpSpPr>
       <p:sp>
         <p:nvSpPr>
-          <p:cNvPr name="Freeform 2" id="2"/>
+          <p:cNvPr id="2" name="Freeform 2"/>
           <p:cNvSpPr/>
           <p:nvPr/>
         </p:nvSpPr>
         <p:spPr>
-          <a:xfrm flipH="false" flipV="false" rot="0">
+          <a:xfrm>
             <a:off x="3572" y="0"/>
             <a:ext cx="18287993" cy="10287000"/>
           </a:xfrm>
@@ -3227,9 +3226,9 @@
             <a:gdLst/>
             <a:ahLst/>
             <a:cxnLst/>
-            <a:rect r="r" b="b" t="t" l="l"/>
+            <a:rect l="l" t="t" r="r" b="b"/>
             <a:pathLst>
-              <a:path h="10287000" w="18287993">
+              <a:path w="18287993" h="10287000">
                 <a:moveTo>
                   <a:pt x="0" y="0"/>
                 </a:moveTo>
@@ -3252,7 +3251,7 @@
           <a:blipFill>
             <a:blip r:embed="rId2"/>
             <a:stretch>
-              <a:fillRect l="0" t="0" r="0" b="0"/>
+              <a:fillRect/>
             </a:stretch>
           </a:blipFill>
         </p:spPr>
@@ -3265,8 +3264,8 @@
 </p:sld>
 </file>
 
-<file path=ppt/slides/slide2.xml><?xml version="1.0" encoding="utf-8"?>
-<p:sld xmlns:p="http://schemas.openxmlformats.org/presentationml/2006/main" xmlns:a="http://schemas.openxmlformats.org/drawingml/2006/main" xmlns:r="http://schemas.openxmlformats.org/officeDocument/2006/relationships">
+<file path=ppt/slides/slide12.xml><?xml version="1.0" encoding="utf-8"?>
+<p:sld xmlns:a="http://schemas.openxmlformats.org/drawingml/2006/main" xmlns:r="http://schemas.openxmlformats.org/officeDocument/2006/relationships" xmlns:p="http://schemas.openxmlformats.org/presentationml/2006/main">
   <p:cSld>
     <p:spTree>
       <p:nvGrpSpPr>
@@ -3284,12 +3283,12 @@
       </p:grpSpPr>
       <p:sp>
         <p:nvSpPr>
-          <p:cNvPr name="Freeform 2" id="2"/>
+          <p:cNvPr id="2" name="Freeform 2"/>
           <p:cNvSpPr/>
           <p:nvPr/>
         </p:nvSpPr>
         <p:spPr>
-          <a:xfrm flipH="false" flipV="false" rot="0">
+          <a:xfrm>
             <a:off x="3572" y="0"/>
             <a:ext cx="18287993" cy="10287000"/>
           </a:xfrm>
@@ -3298,9 +3297,9 @@
             <a:gdLst/>
             <a:ahLst/>
             <a:cxnLst/>
-            <a:rect r="r" b="b" t="t" l="l"/>
+            <a:rect l="l" t="t" r="r" b="b"/>
             <a:pathLst>
-              <a:path h="10287000" w="18287993">
+              <a:path w="18287993" h="10287000">
                 <a:moveTo>
                   <a:pt x="0" y="0"/>
                 </a:moveTo>
@@ -3323,7 +3322,7 @@
           <a:blipFill>
             <a:blip r:embed="rId2"/>
             <a:stretch>
-              <a:fillRect l="0" t="0" r="0" b="0"/>
+              <a:fillRect/>
             </a:stretch>
           </a:blipFill>
         </p:spPr>
@@ -3336,8 +3335,8 @@
 </p:sld>
 </file>
 
-<file path=ppt/slides/slide3.xml><?xml version="1.0" encoding="utf-8"?>
-<p:sld xmlns:p="http://schemas.openxmlformats.org/presentationml/2006/main" xmlns:a="http://schemas.openxmlformats.org/drawingml/2006/main" xmlns:r="http://schemas.openxmlformats.org/officeDocument/2006/relationships">
+<file path=ppt/slides/slide13.xml><?xml version="1.0" encoding="utf-8"?>
+<p:sld xmlns:a="http://schemas.openxmlformats.org/drawingml/2006/main" xmlns:r="http://schemas.openxmlformats.org/officeDocument/2006/relationships" xmlns:p="http://schemas.openxmlformats.org/presentationml/2006/main">
   <p:cSld>
     <p:spTree>
       <p:nvGrpSpPr>
@@ -3355,12 +3354,12 @@
       </p:grpSpPr>
       <p:sp>
         <p:nvSpPr>
-          <p:cNvPr name="Freeform 2" id="2"/>
+          <p:cNvPr id="2" name="Freeform 2"/>
           <p:cNvSpPr/>
           <p:nvPr/>
         </p:nvSpPr>
         <p:spPr>
-          <a:xfrm flipH="false" flipV="false" rot="0">
+          <a:xfrm>
             <a:off x="3572" y="0"/>
             <a:ext cx="18287993" cy="10287000"/>
           </a:xfrm>
@@ -3369,9 +3368,9 @@
             <a:gdLst/>
             <a:ahLst/>
             <a:cxnLst/>
-            <a:rect r="r" b="b" t="t" l="l"/>
+            <a:rect l="l" t="t" r="r" b="b"/>
             <a:pathLst>
-              <a:path h="10287000" w="18287993">
+              <a:path w="18287993" h="10287000">
                 <a:moveTo>
                   <a:pt x="0" y="0"/>
                 </a:moveTo>
@@ -3394,7 +3393,7 @@
           <a:blipFill>
             <a:blip r:embed="rId2"/>
             <a:stretch>
-              <a:fillRect l="0" t="0" r="0" b="0"/>
+              <a:fillRect/>
             </a:stretch>
           </a:blipFill>
         </p:spPr>
@@ -3407,8 +3406,8 @@
 </p:sld>
 </file>
 
-<file path=ppt/slides/slide4.xml><?xml version="1.0" encoding="utf-8"?>
-<p:sld xmlns:p="http://schemas.openxmlformats.org/presentationml/2006/main" xmlns:a="http://schemas.openxmlformats.org/drawingml/2006/main" xmlns:r="http://schemas.openxmlformats.org/officeDocument/2006/relationships">
+<file path=ppt/slides/slide14.xml><?xml version="1.0" encoding="utf-8"?>
+<p:sld xmlns:a="http://schemas.openxmlformats.org/drawingml/2006/main" xmlns:r="http://schemas.openxmlformats.org/officeDocument/2006/relationships" xmlns:p="http://schemas.openxmlformats.org/presentationml/2006/main">
   <p:cSld>
     <p:spTree>
       <p:nvGrpSpPr>
@@ -3426,12 +3425,12 @@
       </p:grpSpPr>
       <p:sp>
         <p:nvSpPr>
-          <p:cNvPr name="Freeform 2" id="2"/>
+          <p:cNvPr id="2" name="Freeform 2"/>
           <p:cNvSpPr/>
           <p:nvPr/>
         </p:nvSpPr>
         <p:spPr>
-          <a:xfrm flipH="false" flipV="false" rot="0">
+          <a:xfrm>
             <a:off x="3572" y="0"/>
             <a:ext cx="18287993" cy="10287000"/>
           </a:xfrm>
@@ -3440,9 +3439,9 @@
             <a:gdLst/>
             <a:ahLst/>
             <a:cxnLst/>
-            <a:rect r="r" b="b" t="t" l="l"/>
+            <a:rect l="l" t="t" r="r" b="b"/>
             <a:pathLst>
-              <a:path h="10287000" w="18287993">
+              <a:path w="18287993" h="10287000">
                 <a:moveTo>
                   <a:pt x="0" y="0"/>
                 </a:moveTo>
@@ -3465,7 +3464,7 @@
           <a:blipFill>
             <a:blip r:embed="rId2"/>
             <a:stretch>
-              <a:fillRect l="0" t="0" r="0" b="0"/>
+              <a:fillRect/>
             </a:stretch>
           </a:blipFill>
         </p:spPr>
@@ -3478,8 +3477,8 @@
 </p:sld>
 </file>
 
-<file path=ppt/slides/slide5.xml><?xml version="1.0" encoding="utf-8"?>
-<p:sld xmlns:p="http://schemas.openxmlformats.org/presentationml/2006/main" xmlns:a="http://schemas.openxmlformats.org/drawingml/2006/main" xmlns:r="http://schemas.openxmlformats.org/officeDocument/2006/relationships">
+<file path=ppt/slides/slide15.xml><?xml version="1.0" encoding="utf-8"?>
+<p:sld xmlns:a="http://schemas.openxmlformats.org/drawingml/2006/main" xmlns:r="http://schemas.openxmlformats.org/officeDocument/2006/relationships" xmlns:p="http://schemas.openxmlformats.org/presentationml/2006/main">
   <p:cSld>
     <p:spTree>
       <p:nvGrpSpPr>
@@ -3497,12 +3496,12 @@
       </p:grpSpPr>
       <p:sp>
         <p:nvSpPr>
-          <p:cNvPr name="Freeform 2" id="2"/>
+          <p:cNvPr id="2" name="Freeform 2"/>
           <p:cNvSpPr/>
           <p:nvPr/>
         </p:nvSpPr>
         <p:spPr>
-          <a:xfrm flipH="false" flipV="false" rot="0">
+          <a:xfrm>
             <a:off x="3572" y="0"/>
             <a:ext cx="18287993" cy="10287000"/>
           </a:xfrm>
@@ -3511,9 +3510,9 @@
             <a:gdLst/>
             <a:ahLst/>
             <a:cxnLst/>
-            <a:rect r="r" b="b" t="t" l="l"/>
+            <a:rect l="l" t="t" r="r" b="b"/>
             <a:pathLst>
-              <a:path h="10287000" w="18287993">
+              <a:path w="18287993" h="10287000">
                 <a:moveTo>
                   <a:pt x="0" y="0"/>
                 </a:moveTo>
@@ -3536,7 +3535,53 @@
           <a:blipFill>
             <a:blip r:embed="rId2"/>
             <a:stretch>
-              <a:fillRect l="0" t="0" r="0" b="0"/>
+              <a:fillRect/>
+            </a:stretch>
+          </a:blipFill>
+        </p:spPr>
+      </p:sp>
+      <p:sp>
+        <p:nvSpPr>
+          <p:cNvPr id="3" name="Freeform 3"/>
+          <p:cNvSpPr/>
+          <p:nvPr/>
+        </p:nvSpPr>
+        <p:spPr>
+          <a:xfrm>
+            <a:off x="14900669" y="9448802"/>
+            <a:ext cx="3009890" cy="457193"/>
+          </a:xfrm>
+          <a:custGeom>
+            <a:avLst/>
+            <a:gdLst/>
+            <a:ahLst/>
+            <a:cxnLst/>
+            <a:rect l="l" t="t" r="r" b="b"/>
+            <a:pathLst>
+              <a:path w="3009890" h="457193">
+                <a:moveTo>
+                  <a:pt x="0" y="0"/>
+                </a:moveTo>
+                <a:lnTo>
+                  <a:pt x="3009891" y="0"/>
+                </a:lnTo>
+                <a:lnTo>
+                  <a:pt x="3009891" y="457193"/>
+                </a:lnTo>
+                <a:lnTo>
+                  <a:pt x="0" y="457193"/>
+                </a:lnTo>
+                <a:lnTo>
+                  <a:pt x="0" y="0"/>
+                </a:lnTo>
+                <a:close/>
+              </a:path>
+            </a:pathLst>
+          </a:custGeom>
+          <a:blipFill>
+            <a:blip r:embed="rId3"/>
+            <a:stretch>
+              <a:fillRect/>
             </a:stretch>
           </a:blipFill>
         </p:spPr>
@@ -3549,8 +3594,8 @@
 </p:sld>
 </file>
 
-<file path=ppt/slides/slide6.xml><?xml version="1.0" encoding="utf-8"?>
-<p:sld xmlns:p="http://schemas.openxmlformats.org/presentationml/2006/main" xmlns:a="http://schemas.openxmlformats.org/drawingml/2006/main" xmlns:r="http://schemas.openxmlformats.org/officeDocument/2006/relationships">
+<file path=ppt/slides/slide16.xml><?xml version="1.0" encoding="utf-8"?>
+<p:sld xmlns:a="http://schemas.openxmlformats.org/drawingml/2006/main" xmlns:r="http://schemas.openxmlformats.org/officeDocument/2006/relationships" xmlns:p="http://schemas.openxmlformats.org/presentationml/2006/main">
   <p:cSld>
     <p:spTree>
       <p:nvGrpSpPr>
@@ -3568,12 +3613,12 @@
       </p:grpSpPr>
       <p:sp>
         <p:nvSpPr>
-          <p:cNvPr name="Freeform 2" id="2"/>
+          <p:cNvPr id="2" name="Freeform 2"/>
           <p:cNvSpPr/>
           <p:nvPr/>
         </p:nvSpPr>
         <p:spPr>
-          <a:xfrm flipH="false" flipV="false" rot="0">
+          <a:xfrm>
             <a:off x="3572" y="0"/>
             <a:ext cx="18287993" cy="10287000"/>
           </a:xfrm>
@@ -3582,9 +3627,9 @@
             <a:gdLst/>
             <a:ahLst/>
             <a:cxnLst/>
-            <a:rect r="r" b="b" t="t" l="l"/>
+            <a:rect l="l" t="t" r="r" b="b"/>
             <a:pathLst>
-              <a:path h="10287000" w="18287993">
+              <a:path w="18287993" h="10287000">
                 <a:moveTo>
                   <a:pt x="0" y="0"/>
                 </a:moveTo>
@@ -3607,7 +3652,7 @@
           <a:blipFill>
             <a:blip r:embed="rId2"/>
             <a:stretch>
-              <a:fillRect l="0" t="0" r="0" b="0"/>
+              <a:fillRect/>
             </a:stretch>
           </a:blipFill>
         </p:spPr>
@@ -3620,8 +3665,8 @@
 </p:sld>
 </file>
 
-<file path=ppt/slides/slide7.xml><?xml version="1.0" encoding="utf-8"?>
-<p:sld xmlns:p="http://schemas.openxmlformats.org/presentationml/2006/main" xmlns:a="http://schemas.openxmlformats.org/drawingml/2006/main" xmlns:r="http://schemas.openxmlformats.org/officeDocument/2006/relationships">
+<file path=ppt/slides/slide17.xml><?xml version="1.0" encoding="utf-8"?>
+<p:sld xmlns:a="http://schemas.openxmlformats.org/drawingml/2006/main" xmlns:r="http://schemas.openxmlformats.org/officeDocument/2006/relationships" xmlns:p="http://schemas.openxmlformats.org/presentationml/2006/main">
   <p:cSld>
     <p:spTree>
       <p:nvGrpSpPr>
@@ -3639,12 +3684,12 @@
       </p:grpSpPr>
       <p:sp>
         <p:nvSpPr>
-          <p:cNvPr name="Freeform 2" id="2"/>
+          <p:cNvPr id="2" name="Freeform 2"/>
           <p:cNvSpPr/>
           <p:nvPr/>
         </p:nvSpPr>
         <p:spPr>
-          <a:xfrm flipH="false" flipV="false" rot="0">
+          <a:xfrm>
             <a:off x="3572" y="0"/>
             <a:ext cx="18287993" cy="10287000"/>
           </a:xfrm>
@@ -3653,9 +3698,9 @@
             <a:gdLst/>
             <a:ahLst/>
             <a:cxnLst/>
-            <a:rect r="r" b="b" t="t" l="l"/>
+            <a:rect l="l" t="t" r="r" b="b"/>
             <a:pathLst>
-              <a:path h="10287000" w="18287993">
+              <a:path w="18287993" h="10287000">
                 <a:moveTo>
                   <a:pt x="0" y="0"/>
                 </a:moveTo>
@@ -3678,7 +3723,7 @@
           <a:blipFill>
             <a:blip r:embed="rId2"/>
             <a:stretch>
-              <a:fillRect l="0" t="0" r="0" b="0"/>
+              <a:fillRect/>
             </a:stretch>
           </a:blipFill>
         </p:spPr>
@@ -3691,8 +3736,8 @@
 </p:sld>
 </file>
 
-<file path=ppt/slides/slide8.xml><?xml version="1.0" encoding="utf-8"?>
-<p:sld xmlns:p="http://schemas.openxmlformats.org/presentationml/2006/main" xmlns:a="http://schemas.openxmlformats.org/drawingml/2006/main" xmlns:r="http://schemas.openxmlformats.org/officeDocument/2006/relationships">
+<file path=ppt/slides/slide2.xml><?xml version="1.0" encoding="utf-8"?>
+<p:sld xmlns:a="http://schemas.openxmlformats.org/drawingml/2006/main" xmlns:r="http://schemas.openxmlformats.org/officeDocument/2006/relationships" xmlns:p="http://schemas.openxmlformats.org/presentationml/2006/main">
   <p:cSld>
     <p:spTree>
       <p:nvGrpSpPr>
@@ -3710,12 +3755,12 @@
       </p:grpSpPr>
       <p:sp>
         <p:nvSpPr>
-          <p:cNvPr name="Freeform 2" id="2"/>
+          <p:cNvPr id="2" name="Freeform 2"/>
           <p:cNvSpPr/>
           <p:nvPr/>
         </p:nvSpPr>
         <p:spPr>
-          <a:xfrm flipH="false" flipV="false" rot="0">
+          <a:xfrm>
             <a:off x="3572" y="0"/>
             <a:ext cx="18287993" cy="10287000"/>
           </a:xfrm>
@@ -3724,9 +3769,9 @@
             <a:gdLst/>
             <a:ahLst/>
             <a:cxnLst/>
-            <a:rect r="r" b="b" t="t" l="l"/>
+            <a:rect l="l" t="t" r="r" b="b"/>
             <a:pathLst>
-              <a:path h="10287000" w="18287993">
+              <a:path w="18287993" h="10287000">
                 <a:moveTo>
                   <a:pt x="0" y="0"/>
                 </a:moveTo>
@@ -3749,7 +3794,7 @@
           <a:blipFill>
             <a:blip r:embed="rId2"/>
             <a:stretch>
-              <a:fillRect l="0" t="0" r="0" b="0"/>
+              <a:fillRect/>
             </a:stretch>
           </a:blipFill>
         </p:spPr>
@@ -3762,8 +3807,8 @@
 </p:sld>
 </file>
 
-<file path=ppt/slides/slide9.xml><?xml version="1.0" encoding="utf-8"?>
-<p:sld xmlns:p="http://schemas.openxmlformats.org/presentationml/2006/main" xmlns:a="http://schemas.openxmlformats.org/drawingml/2006/main" xmlns:r="http://schemas.openxmlformats.org/officeDocument/2006/relationships">
+<file path=ppt/slides/slide3.xml><?xml version="1.0" encoding="utf-8"?>
+<p:sld xmlns:a="http://schemas.openxmlformats.org/drawingml/2006/main" xmlns:r="http://schemas.openxmlformats.org/officeDocument/2006/relationships" xmlns:p="http://schemas.openxmlformats.org/presentationml/2006/main">
   <p:cSld>
     <p:spTree>
       <p:nvGrpSpPr>
@@ -3781,12 +3826,12 @@
       </p:grpSpPr>
       <p:sp>
         <p:nvSpPr>
-          <p:cNvPr name="Freeform 2" id="2"/>
+          <p:cNvPr id="2" name="Freeform 2"/>
           <p:cNvSpPr/>
           <p:nvPr/>
         </p:nvSpPr>
         <p:spPr>
-          <a:xfrm flipH="false" flipV="false" rot="0">
+          <a:xfrm>
             <a:off x="3572" y="0"/>
             <a:ext cx="18287993" cy="10287000"/>
           </a:xfrm>
@@ -3795,9 +3840,9 @@
             <a:gdLst/>
             <a:ahLst/>
             <a:cxnLst/>
-            <a:rect r="r" b="b" t="t" l="l"/>
+            <a:rect l="l" t="t" r="r" b="b"/>
             <a:pathLst>
-              <a:path h="10287000" w="18287993">
+              <a:path w="18287993" h="10287000">
                 <a:moveTo>
                   <a:pt x="0" y="0"/>
                 </a:moveTo>
@@ -3820,41 +3865,66 @@
           <a:blipFill>
             <a:blip r:embed="rId2"/>
             <a:stretch>
-              <a:fillRect l="0" t="0" r="0" b="0"/>
+              <a:fillRect/>
             </a:stretch>
           </a:blipFill>
         </p:spPr>
       </p:sp>
-      <p:sp>
-        <p:nvSpPr>
-          <p:cNvPr name="Freeform 3" id="3"/>
+    </p:spTree>
+  </p:cSld>
+  <p:clrMapOvr>
+    <a:masterClrMapping/>
+  </p:clrMapOvr>
+</p:sld>
+</file>
+
+<file path=ppt/slides/slide4.xml><?xml version="1.0" encoding="utf-8"?>
+<p:sld xmlns:a="http://schemas.openxmlformats.org/drawingml/2006/main" xmlns:r="http://schemas.openxmlformats.org/officeDocument/2006/relationships" xmlns:p="http://schemas.openxmlformats.org/presentationml/2006/main">
+  <p:cSld>
+    <p:spTree>
+      <p:nvGrpSpPr>
+        <p:cNvPr id="1" name=""/>
+        <p:cNvGrpSpPr/>
+        <p:nvPr/>
+      </p:nvGrpSpPr>
+      <p:grpSpPr>
+        <a:xfrm>
+          <a:off x="0" y="0"/>
+          <a:ext cx="0" cy="0"/>
+          <a:chOff x="0" y="0"/>
+          <a:chExt cx="0" cy="0"/>
+        </a:xfrm>
+      </p:grpSpPr>
+      <p:sp>
+        <p:nvSpPr>
+          <p:cNvPr id="2" name="Freeform 2"/>
           <p:cNvSpPr/>
           <p:nvPr/>
         </p:nvSpPr>
         <p:spPr>
-          <a:xfrm flipH="false" flipV="false" rot="0">
-            <a:off x="14900669" y="9448802"/>
-            <a:ext cx="3009890" cy="457193"/>
+          <a:xfrm>
+            <a:off x="3572" y="0"/>
+            <a:ext cx="18287993" cy="10287000"/>
           </a:xfrm>
           <a:custGeom>
             <a:avLst/>
             <a:gdLst/>
             <a:ahLst/>
             <a:cxnLst/>
-            <a:rect r="r" b="b" t="t" l="l"/>
+            <a:rect l="l" t="t" r="r" b="b"/>
             <a:pathLst>
-              <a:path h="457193" w="3009890">
+              <a:path w="18287993" h="10287000">
                 <a:moveTo>
                   <a:pt x="0" y="0"/>
                 </a:moveTo>
                 <a:lnTo>
-                  <a:pt x="3009891" y="0"/>
-                </a:lnTo>
-                <a:lnTo>
-                  <a:pt x="3009891" y="457193"/>
-                </a:lnTo>
-                <a:lnTo>
-                  <a:pt x="0" y="457193"/>
+                  <a:pt x="18287993" y="0"/>
+                </a:lnTo>
+                <a:lnTo>
+                  <a:pt x="18287993" y="10287000"/>
+                </a:lnTo>
+                <a:lnTo>
+                  <a:pt x="0" y="10287000"/>
                 </a:lnTo>
                 <a:lnTo>
                   <a:pt x="0" y="0"/>
@@ -3864,14 +3934,392 @@
             </a:pathLst>
           </a:custGeom>
           <a:blipFill>
-            <a:blip r:embed="rId3"/>
+            <a:blip r:embed="rId2"/>
             <a:stretch>
-              <a:fillRect l="0" t="0" r="0" b="0"/>
+              <a:fillRect/>
             </a:stretch>
           </a:blipFill>
         </p:spPr>
       </p:sp>
     </p:spTree>
+  </p:cSld>
+  <p:clrMapOvr>
+    <a:masterClrMapping/>
+  </p:clrMapOvr>
+</p:sld>
+</file>
+
+<file path=ppt/slides/slide5.xml><?xml version="1.0" encoding="utf-8"?>
+<p:sld xmlns:a="http://schemas.openxmlformats.org/drawingml/2006/main" xmlns:r="http://schemas.openxmlformats.org/officeDocument/2006/relationships" xmlns:p="http://schemas.openxmlformats.org/presentationml/2006/main">
+  <p:cSld>
+    <p:spTree>
+      <p:nvGrpSpPr>
+        <p:cNvPr id="1" name=""/>
+        <p:cNvGrpSpPr/>
+        <p:nvPr/>
+      </p:nvGrpSpPr>
+      <p:grpSpPr>
+        <a:xfrm>
+          <a:off x="0" y="0"/>
+          <a:ext cx="0" cy="0"/>
+          <a:chOff x="0" y="0"/>
+          <a:chExt cx="0" cy="0"/>
+        </a:xfrm>
+      </p:grpSpPr>
+      <p:pic>
+        <p:nvPicPr>
+          <p:cNvPr id="3" name="Picture 2">
+            <a:extLst>
+              <a:ext uri="{FF2B5EF4-FFF2-40B4-BE49-F238E27FC236}">
+                <a16:creationId xmlns:a16="http://schemas.microsoft.com/office/drawing/2014/main" id="{91ED77C1-128D-68A5-5740-2863B4C24B45}"/>
+              </a:ext>
+            </a:extLst>
+          </p:cNvPr>
+          <p:cNvPicPr>
+            <a:picLocks noChangeAspect="1"/>
+          </p:cNvPicPr>
+          <p:nvPr/>
+        </p:nvPicPr>
+        <p:blipFill>
+          <a:blip r:embed="rId2">
+            <a:extLst>
+              <a:ext uri="{28A0092B-C50C-407E-A947-70E740481C1C}">
+                <a14:useLocalDpi xmlns:a14="http://schemas.microsoft.com/office/drawing/2010/main" val="0"/>
+              </a:ext>
+            </a:extLst>
+          </a:blip>
+          <a:stretch>
+            <a:fillRect/>
+          </a:stretch>
+        </p:blipFill>
+        <p:spPr>
+          <a:xfrm>
+            <a:off x="-33337" y="14654"/>
+            <a:ext cx="18321337" cy="9937414"/>
+          </a:xfrm>
+          <a:prstGeom prst="rect">
+            <a:avLst/>
+          </a:prstGeom>
+        </p:spPr>
+      </p:pic>
+      <p:pic>
+        <p:nvPicPr>
+          <p:cNvPr id="15" name="Picture 14">
+            <a:extLst>
+              <a:ext uri="{FF2B5EF4-FFF2-40B4-BE49-F238E27FC236}">
+                <a16:creationId xmlns:a16="http://schemas.microsoft.com/office/drawing/2014/main" id="{A960EB3A-B650-1FB5-B04B-FC55D4684C1B}"/>
+              </a:ext>
+            </a:extLst>
+          </p:cNvPr>
+          <p:cNvPicPr>
+            <a:picLocks noChangeAspect="1"/>
+          </p:cNvPicPr>
+          <p:nvPr/>
+        </p:nvPicPr>
+        <p:blipFill>
+          <a:blip r:embed="rId3">
+            <a:extLst>
+              <a:ext uri="{28A0092B-C50C-407E-A947-70E740481C1C}">
+                <a14:useLocalDpi xmlns:a14="http://schemas.microsoft.com/office/drawing/2010/main" val="0"/>
+              </a:ext>
+            </a:extLst>
+          </a:blip>
+          <a:stretch>
+            <a:fillRect/>
+          </a:stretch>
+        </p:blipFill>
+        <p:spPr>
+          <a:xfrm>
+            <a:off x="-33337" y="0"/>
+            <a:ext cx="18911824" cy="10257692"/>
+          </a:xfrm>
+          <a:prstGeom prst="rect">
+            <a:avLst/>
+          </a:prstGeom>
+        </p:spPr>
+      </p:pic>
+    </p:spTree>
+    <p:extLst>
+      <p:ext uri="{BB962C8B-B14F-4D97-AF65-F5344CB8AC3E}">
+        <p14:creationId xmlns:p14="http://schemas.microsoft.com/office/powerpoint/2010/main" val="2276520221"/>
+      </p:ext>
+    </p:extLst>
+  </p:cSld>
+  <p:clrMapOvr>
+    <a:masterClrMapping/>
+  </p:clrMapOvr>
+</p:sld>
+</file>
+
+<file path=ppt/slides/slide6.xml><?xml version="1.0" encoding="utf-8"?>
+<p:sld xmlns:a="http://schemas.openxmlformats.org/drawingml/2006/main" xmlns:r="http://schemas.openxmlformats.org/officeDocument/2006/relationships" xmlns:p="http://schemas.openxmlformats.org/presentationml/2006/main">
+  <p:cSld>
+    <p:spTree>
+      <p:nvGrpSpPr>
+        <p:cNvPr id="1" name=""/>
+        <p:cNvGrpSpPr/>
+        <p:nvPr/>
+      </p:nvGrpSpPr>
+      <p:grpSpPr>
+        <a:xfrm>
+          <a:off x="0" y="0"/>
+          <a:ext cx="0" cy="0"/>
+          <a:chOff x="0" y="0"/>
+          <a:chExt cx="0" cy="0"/>
+        </a:xfrm>
+      </p:grpSpPr>
+      <p:pic>
+        <p:nvPicPr>
+          <p:cNvPr id="21" name="Picture 20">
+            <a:extLst>
+              <a:ext uri="{FF2B5EF4-FFF2-40B4-BE49-F238E27FC236}">
+                <a16:creationId xmlns:a16="http://schemas.microsoft.com/office/drawing/2014/main" id="{A0EECCD5-14D5-9CB5-4B43-F36F686F321A}"/>
+              </a:ext>
+            </a:extLst>
+          </p:cNvPr>
+          <p:cNvPicPr>
+            <a:picLocks noChangeAspect="1"/>
+          </p:cNvPicPr>
+          <p:nvPr/>
+        </p:nvPicPr>
+        <p:blipFill>
+          <a:blip r:embed="rId2">
+            <a:extLst>
+              <a:ext uri="{28A0092B-C50C-407E-A947-70E740481C1C}">
+                <a14:useLocalDpi xmlns:a14="http://schemas.microsoft.com/office/drawing/2010/main" val="0"/>
+              </a:ext>
+            </a:extLst>
+          </a:blip>
+          <a:stretch>
+            <a:fillRect/>
+          </a:stretch>
+        </p:blipFill>
+        <p:spPr>
+          <a:xfrm>
+            <a:off x="4067331" y="304800"/>
+            <a:ext cx="10153337" cy="9677400"/>
+          </a:xfrm>
+          <a:prstGeom prst="rect">
+            <a:avLst/>
+          </a:prstGeom>
+        </p:spPr>
+      </p:pic>
+    </p:spTree>
+    <p:extLst>
+      <p:ext uri="{BB962C8B-B14F-4D97-AF65-F5344CB8AC3E}">
+        <p14:creationId xmlns:p14="http://schemas.microsoft.com/office/powerpoint/2010/main" val="816432830"/>
+      </p:ext>
+    </p:extLst>
+  </p:cSld>
+  <p:clrMapOvr>
+    <a:masterClrMapping/>
+  </p:clrMapOvr>
+</p:sld>
+</file>
+
+<file path=ppt/slides/slide7.xml><?xml version="1.0" encoding="utf-8"?>
+<p:sld xmlns:a="http://schemas.openxmlformats.org/drawingml/2006/main" xmlns:r="http://schemas.openxmlformats.org/officeDocument/2006/relationships" xmlns:p="http://schemas.openxmlformats.org/presentationml/2006/main">
+  <p:cSld>
+    <p:spTree>
+      <p:nvGrpSpPr>
+        <p:cNvPr id="1" name=""/>
+        <p:cNvGrpSpPr/>
+        <p:nvPr/>
+      </p:nvGrpSpPr>
+      <p:grpSpPr>
+        <a:xfrm>
+          <a:off x="0" y="0"/>
+          <a:ext cx="0" cy="0"/>
+          <a:chOff x="0" y="0"/>
+          <a:chExt cx="0" cy="0"/>
+        </a:xfrm>
+      </p:grpSpPr>
+      <p:pic>
+        <p:nvPicPr>
+          <p:cNvPr id="23" name="Picture 22">
+            <a:extLst>
+              <a:ext uri="{FF2B5EF4-FFF2-40B4-BE49-F238E27FC236}">
+                <a16:creationId xmlns:a16="http://schemas.microsoft.com/office/drawing/2014/main" id="{B822B430-CF49-40E6-1DBA-02A8B7F1608D}"/>
+              </a:ext>
+            </a:extLst>
+          </p:cNvPr>
+          <p:cNvPicPr>
+            <a:picLocks noChangeAspect="1"/>
+          </p:cNvPicPr>
+          <p:nvPr/>
+        </p:nvPicPr>
+        <p:blipFill>
+          <a:blip r:embed="rId2">
+            <a:extLst>
+              <a:ext uri="{28A0092B-C50C-407E-A947-70E740481C1C}">
+                <a14:useLocalDpi xmlns:a14="http://schemas.microsoft.com/office/drawing/2010/main" val="0"/>
+              </a:ext>
+            </a:extLst>
+          </a:blip>
+          <a:stretch>
+            <a:fillRect/>
+          </a:stretch>
+        </p:blipFill>
+        <p:spPr>
+          <a:xfrm>
+            <a:off x="65411" y="1028700"/>
+            <a:ext cx="18298789" cy="8077200"/>
+          </a:xfrm>
+          <a:prstGeom prst="rect">
+            <a:avLst/>
+          </a:prstGeom>
+        </p:spPr>
+      </p:pic>
+    </p:spTree>
+    <p:extLst>
+      <p:ext uri="{BB962C8B-B14F-4D97-AF65-F5344CB8AC3E}">
+        <p14:creationId xmlns:p14="http://schemas.microsoft.com/office/powerpoint/2010/main" val="3085655491"/>
+      </p:ext>
+    </p:extLst>
+  </p:cSld>
+  <p:clrMapOvr>
+    <a:masterClrMapping/>
+  </p:clrMapOvr>
+</p:sld>
+</file>
+
+<file path=ppt/slides/slide8.xml><?xml version="1.0" encoding="utf-8"?>
+<p:sld xmlns:a="http://schemas.openxmlformats.org/drawingml/2006/main" xmlns:r="http://schemas.openxmlformats.org/officeDocument/2006/relationships" xmlns:p="http://schemas.openxmlformats.org/presentationml/2006/main">
+  <p:cSld>
+    <p:spTree>
+      <p:nvGrpSpPr>
+        <p:cNvPr id="1" name="">
+          <a:extLst>
+            <a:ext uri="{FF2B5EF4-FFF2-40B4-BE49-F238E27FC236}">
+              <a16:creationId xmlns:a16="http://schemas.microsoft.com/office/drawing/2014/main" id="{9582EA31-6313-4C40-AABC-695576AB9FE1}"/>
+            </a:ext>
+          </a:extLst>
+        </p:cNvPr>
+        <p:cNvGrpSpPr/>
+        <p:nvPr/>
+      </p:nvGrpSpPr>
+      <p:grpSpPr>
+        <a:xfrm>
+          <a:off x="0" y="0"/>
+          <a:ext cx="0" cy="0"/>
+          <a:chOff x="0" y="0"/>
+          <a:chExt cx="0" cy="0"/>
+        </a:xfrm>
+      </p:grpSpPr>
+      <p:pic>
+        <p:nvPicPr>
+          <p:cNvPr id="19" name="Picture 18">
+            <a:extLst>
+              <a:ext uri="{FF2B5EF4-FFF2-40B4-BE49-F238E27FC236}">
+                <a16:creationId xmlns:a16="http://schemas.microsoft.com/office/drawing/2014/main" id="{1AA07890-D57C-C5FE-A4A5-8214A693882A}"/>
+              </a:ext>
+            </a:extLst>
+          </p:cNvPr>
+          <p:cNvPicPr>
+            <a:picLocks noChangeAspect="1"/>
+          </p:cNvPicPr>
+          <p:nvPr/>
+        </p:nvPicPr>
+        <p:blipFill>
+          <a:blip r:embed="rId2">
+            <a:extLst>
+              <a:ext uri="{28A0092B-C50C-407E-A947-70E740481C1C}">
+                <a14:useLocalDpi xmlns:a14="http://schemas.microsoft.com/office/drawing/2010/main" val="0"/>
+              </a:ext>
+            </a:extLst>
+          </a:blip>
+          <a:stretch>
+            <a:fillRect/>
+          </a:stretch>
+        </p:blipFill>
+        <p:spPr>
+          <a:xfrm>
+            <a:off x="126023" y="-19259"/>
+            <a:ext cx="18035954" cy="10306259"/>
+          </a:xfrm>
+          <a:prstGeom prst="rect">
+            <a:avLst/>
+          </a:prstGeom>
+        </p:spPr>
+      </p:pic>
+    </p:spTree>
+    <p:extLst>
+      <p:ext uri="{BB962C8B-B14F-4D97-AF65-F5344CB8AC3E}">
+        <p14:creationId xmlns:p14="http://schemas.microsoft.com/office/powerpoint/2010/main" val="1817447467"/>
+      </p:ext>
+    </p:extLst>
+  </p:cSld>
+  <p:clrMapOvr>
+    <a:masterClrMapping/>
+  </p:clrMapOvr>
+</p:sld>
+</file>
+
+<file path=ppt/slides/slide9.xml><?xml version="1.0" encoding="utf-8"?>
+<p:sld xmlns:a="http://schemas.openxmlformats.org/drawingml/2006/main" xmlns:r="http://schemas.openxmlformats.org/officeDocument/2006/relationships" xmlns:p="http://schemas.openxmlformats.org/presentationml/2006/main">
+  <p:cSld>
+    <p:spTree>
+      <p:nvGrpSpPr>
+        <p:cNvPr id="1" name="">
+          <a:extLst>
+            <a:ext uri="{FF2B5EF4-FFF2-40B4-BE49-F238E27FC236}">
+              <a16:creationId xmlns:a16="http://schemas.microsoft.com/office/drawing/2014/main" id="{39BA710A-82C3-48BF-4531-167F010C0DDA}"/>
+            </a:ext>
+          </a:extLst>
+        </p:cNvPr>
+        <p:cNvGrpSpPr/>
+        <p:nvPr/>
+      </p:nvGrpSpPr>
+      <p:grpSpPr>
+        <a:xfrm>
+          <a:off x="0" y="0"/>
+          <a:ext cx="0" cy="0"/>
+          <a:chOff x="0" y="0"/>
+          <a:chExt cx="0" cy="0"/>
+        </a:xfrm>
+      </p:grpSpPr>
+      <p:pic>
+        <p:nvPicPr>
+          <p:cNvPr id="25" name="Picture 24">
+            <a:extLst>
+              <a:ext uri="{FF2B5EF4-FFF2-40B4-BE49-F238E27FC236}">
+                <a16:creationId xmlns:a16="http://schemas.microsoft.com/office/drawing/2014/main" id="{1F9C160F-2804-6848-5BBA-C85750683027}"/>
+              </a:ext>
+            </a:extLst>
+          </p:cNvPr>
+          <p:cNvPicPr>
+            <a:picLocks noChangeAspect="1"/>
+          </p:cNvPicPr>
+          <p:nvPr/>
+        </p:nvPicPr>
+        <p:blipFill>
+          <a:blip r:embed="rId2">
+            <a:extLst>
+              <a:ext uri="{28A0092B-C50C-407E-A947-70E740481C1C}">
+                <a14:useLocalDpi xmlns:a14="http://schemas.microsoft.com/office/drawing/2010/main" val="0"/>
+              </a:ext>
+            </a:extLst>
+          </a:blip>
+          <a:stretch>
+            <a:fillRect/>
+          </a:stretch>
+        </p:blipFill>
+        <p:spPr>
+          <a:xfrm>
+            <a:off x="3848100" y="0"/>
+            <a:ext cx="10591800" cy="10309352"/>
+          </a:xfrm>
+          <a:prstGeom prst="rect">
+            <a:avLst/>
+          </a:prstGeom>
+        </p:spPr>
+      </p:pic>
+    </p:spTree>
+    <p:extLst>
+      <p:ext uri="{BB962C8B-B14F-4D97-AF65-F5344CB8AC3E}">
+        <p14:creationId xmlns:p14="http://schemas.microsoft.com/office/powerpoint/2010/main" val="2932536432"/>
+      </p:ext>
+    </p:extLst>
   </p:cSld>
   <p:clrMapOvr>
     <a:masterClrMapping/>

</xml_diff>